<commit_message>
lab 1 notebook + slide 01 corrections
</commit_message>
<xml_diff>
--- a/course slides/week_01.pptx
+++ b/course slides/week_01.pptx
@@ -210,7 +210,7 @@
           <a:p>
             <a:fld id="{E7BF058D-E663-3E48-99D5-AFD0BCA1823C}" type="datetimeFigureOut">
               <a:rPr lang="en-US" smtClean="0"/>
-              <a:t>8/22/20</a:t>
+              <a:t>9/1/21</a:t>
             </a:fld>
             <a:endParaRPr lang="en-US"/>
           </a:p>
@@ -708,7 +708,7 @@
           <a:p>
             <a:fld id="{78A61C02-5DDA-4742-BA9F-16C918E9CF6D}" type="datetime1">
               <a:rPr lang="en-US" smtClean="0"/>
-              <a:t>8/22/20</a:t>
+              <a:t>9/1/21</a:t>
             </a:fld>
             <a:endParaRPr lang="en-US"/>
           </a:p>
@@ -906,7 +906,7 @@
           <a:p>
             <a:fld id="{548886B6-90A8-3541-BA71-86E77F56DAB4}" type="datetime1">
               <a:rPr lang="en-US" smtClean="0"/>
-              <a:t>8/22/20</a:t>
+              <a:t>9/1/21</a:t>
             </a:fld>
             <a:endParaRPr lang="en-US"/>
           </a:p>
@@ -1114,7 +1114,7 @@
           <a:p>
             <a:fld id="{852FF3A3-1CCF-A84D-A287-5CAF30DE28F4}" type="datetime1">
               <a:rPr lang="en-US" smtClean="0"/>
-              <a:t>8/22/20</a:t>
+              <a:t>9/1/21</a:t>
             </a:fld>
             <a:endParaRPr lang="en-US"/>
           </a:p>
@@ -1312,7 +1312,7 @@
           <a:p>
             <a:fld id="{8C15019A-578B-EF42-A6FE-609BC777F59C}" type="datetime1">
               <a:rPr lang="en-US" smtClean="0"/>
-              <a:t>8/22/20</a:t>
+              <a:t>9/1/21</a:t>
             </a:fld>
             <a:endParaRPr lang="en-US"/>
           </a:p>
@@ -1587,7 +1587,7 @@
           <a:p>
             <a:fld id="{8CF19FEC-2E87-404D-A86C-ABD7A0A24F55}" type="datetime1">
               <a:rPr lang="en-US" smtClean="0"/>
-              <a:t>8/22/20</a:t>
+              <a:t>9/1/21</a:t>
             </a:fld>
             <a:endParaRPr lang="en-US"/>
           </a:p>
@@ -1852,7 +1852,7 @@
           <a:p>
             <a:fld id="{446EA608-0CB1-7045-BE57-7D86CEA40281}" type="datetime1">
               <a:rPr lang="en-US" smtClean="0"/>
-              <a:t>8/22/20</a:t>
+              <a:t>9/1/21</a:t>
             </a:fld>
             <a:endParaRPr lang="en-US"/>
           </a:p>
@@ -2264,7 +2264,7 @@
           <a:p>
             <a:fld id="{C727496E-E60B-0146-8488-196488F29A43}" type="datetime1">
               <a:rPr lang="en-US" smtClean="0"/>
-              <a:t>8/22/20</a:t>
+              <a:t>9/1/21</a:t>
             </a:fld>
             <a:endParaRPr lang="en-US"/>
           </a:p>
@@ -2405,7 +2405,7 @@
           <a:p>
             <a:fld id="{F546FB0E-EB75-9B48-A4BD-2C5B9A04751D}" type="datetime1">
               <a:rPr lang="en-US" smtClean="0"/>
-              <a:t>8/22/20</a:t>
+              <a:t>9/1/21</a:t>
             </a:fld>
             <a:endParaRPr lang="en-US"/>
           </a:p>
@@ -2518,7 +2518,7 @@
           <a:p>
             <a:fld id="{A456FF61-9A5E-1841-AE70-3D847B065C08}" type="datetime1">
               <a:rPr lang="en-US" smtClean="0"/>
-              <a:t>8/22/20</a:t>
+              <a:t>9/1/21</a:t>
             </a:fld>
             <a:endParaRPr lang="en-US"/>
           </a:p>
@@ -2829,7 +2829,7 @@
           <a:p>
             <a:fld id="{FE8A8F49-DF40-F949-8DE2-65B98C5FEDD7}" type="datetime1">
               <a:rPr lang="en-US" smtClean="0"/>
-              <a:t>8/22/20</a:t>
+              <a:t>9/1/21</a:t>
             </a:fld>
             <a:endParaRPr lang="en-US"/>
           </a:p>
@@ -3117,7 +3117,7 @@
           <a:p>
             <a:fld id="{A85EFE4E-DFE8-4C42-98CC-30B935E5C550}" type="datetime1">
               <a:rPr lang="en-US" smtClean="0"/>
-              <a:t>8/22/20</a:t>
+              <a:t>9/1/21</a:t>
             </a:fld>
             <a:endParaRPr lang="en-US"/>
           </a:p>
@@ -3358,7 +3358,7 @@
           <a:p>
             <a:fld id="{5A0C85FA-79DF-354D-A01A-3E5AA821AAF9}" type="datetime1">
               <a:rPr lang="en-US" smtClean="0"/>
-              <a:t>8/22/20</a:t>
+              <a:t>9/1/21</a:t>
             </a:fld>
             <a:endParaRPr lang="en-US"/>
           </a:p>
@@ -3978,7 +3978,7 @@
           <a:p>
             <a:r>
               <a:rPr lang="en-US" dirty="0"/>
-              <a:t>Don’t be clever.</a:t>
+              <a:t>Don’t be clever!</a:t>
             </a:r>
           </a:p>
           <a:p>
@@ -5193,7 +5193,10 @@
           <a:bodyPr/>
           <a:lstStyle/>
           <a:p>
-            <a:endParaRPr lang="en-US"/>
+            <a:r>
+              <a:rPr lang="en-US" dirty="0"/>
+              <a:t>Source: Machine learning, XKCD</a:t>
+            </a:r>
           </a:p>
         </p:txBody>
       </p:sp>
@@ -5215,14 +5218,13 @@
         </p:nvPicPr>
         <p:blipFill>
           <a:blip r:embed="rId2"/>
-          <a:stretch>
-            <a:fillRect/>
-          </a:stretch>
+          <a:srcRect/>
+          <a:stretch/>
         </p:blipFill>
         <p:spPr>
           <a:xfrm>
-            <a:off x="4002168" y="1396206"/>
-            <a:ext cx="4187663" cy="4960144"/>
+            <a:off x="4002168" y="1398671"/>
+            <a:ext cx="4187663" cy="4955213"/>
           </a:xfrm>
         </p:spPr>
       </p:pic>
@@ -5415,13 +5417,8 @@
           <a:p>
             <a:r>
               <a:rPr lang="en-US" dirty="0"/>
-              <a:t>Other Machine Learning </a:t>
-            </a:r>
-            <a:r>
-              <a:rPr lang="en-US" dirty="0" err="1"/>
-              <a:t>Consideratoin</a:t>
-            </a:r>
-            <a:endParaRPr lang="en-US" dirty="0"/>
+              <a:t>Other Machine Learning Considerations</a:t>
+            </a:r>
           </a:p>
         </p:txBody>
       </p:sp>
@@ -5986,7 +5983,7 @@
           <a:p>
             <a:r>
               <a:rPr lang="en-US" dirty="0"/>
-              <a:t>Follow conventions</a:t>
+              <a:t>Follow conventions.</a:t>
             </a:r>
           </a:p>
           <a:p>

</xml_diff>

<commit_message>
week 1 link fixed
</commit_message>
<xml_diff>
--- a/course slides/week_01.pptx
+++ b/course slides/week_01.pptx
@@ -211,7 +211,7 @@
           <a:p>
             <a:fld id="{E7BF058D-E663-3E48-99D5-AFD0BCA1823C}" type="datetimeFigureOut">
               <a:rPr lang="en-US" smtClean="0"/>
-              <a:t>9/2/21</a:t>
+              <a:t>9/13/21</a:t>
             </a:fld>
             <a:endParaRPr lang="en-US"/>
           </a:p>
@@ -811,7 +811,7 @@
           <a:p>
             <a:fld id="{78A61C02-5DDA-4742-BA9F-16C918E9CF6D}" type="datetime1">
               <a:rPr lang="en-US" smtClean="0"/>
-              <a:t>9/2/21</a:t>
+              <a:t>9/13/21</a:t>
             </a:fld>
             <a:endParaRPr lang="en-US"/>
           </a:p>
@@ -1009,7 +1009,7 @@
           <a:p>
             <a:fld id="{548886B6-90A8-3541-BA71-86E77F56DAB4}" type="datetime1">
               <a:rPr lang="en-US" smtClean="0"/>
-              <a:t>9/2/21</a:t>
+              <a:t>9/13/21</a:t>
             </a:fld>
             <a:endParaRPr lang="en-US"/>
           </a:p>
@@ -1217,7 +1217,7 @@
           <a:p>
             <a:fld id="{852FF3A3-1CCF-A84D-A287-5CAF30DE28F4}" type="datetime1">
               <a:rPr lang="en-US" smtClean="0"/>
-              <a:t>9/2/21</a:t>
+              <a:t>9/13/21</a:t>
             </a:fld>
             <a:endParaRPr lang="en-US"/>
           </a:p>
@@ -1415,7 +1415,7 @@
           <a:p>
             <a:fld id="{8C15019A-578B-EF42-A6FE-609BC777F59C}" type="datetime1">
               <a:rPr lang="en-US" smtClean="0"/>
-              <a:t>9/2/21</a:t>
+              <a:t>9/13/21</a:t>
             </a:fld>
             <a:endParaRPr lang="en-US"/>
           </a:p>
@@ -1690,7 +1690,7 @@
           <a:p>
             <a:fld id="{8CF19FEC-2E87-404D-A86C-ABD7A0A24F55}" type="datetime1">
               <a:rPr lang="en-US" smtClean="0"/>
-              <a:t>9/2/21</a:t>
+              <a:t>9/13/21</a:t>
             </a:fld>
             <a:endParaRPr lang="en-US"/>
           </a:p>
@@ -1955,7 +1955,7 @@
           <a:p>
             <a:fld id="{446EA608-0CB1-7045-BE57-7D86CEA40281}" type="datetime1">
               <a:rPr lang="en-US" smtClean="0"/>
-              <a:t>9/2/21</a:t>
+              <a:t>9/13/21</a:t>
             </a:fld>
             <a:endParaRPr lang="en-US"/>
           </a:p>
@@ -2367,7 +2367,7 @@
           <a:p>
             <a:fld id="{C727496E-E60B-0146-8488-196488F29A43}" type="datetime1">
               <a:rPr lang="en-US" smtClean="0"/>
-              <a:t>9/2/21</a:t>
+              <a:t>9/13/21</a:t>
             </a:fld>
             <a:endParaRPr lang="en-US"/>
           </a:p>
@@ -2508,7 +2508,7 @@
           <a:p>
             <a:fld id="{F546FB0E-EB75-9B48-A4BD-2C5B9A04751D}" type="datetime1">
               <a:rPr lang="en-US" smtClean="0"/>
-              <a:t>9/2/21</a:t>
+              <a:t>9/13/21</a:t>
             </a:fld>
             <a:endParaRPr lang="en-US"/>
           </a:p>
@@ -2621,7 +2621,7 @@
           <a:p>
             <a:fld id="{A456FF61-9A5E-1841-AE70-3D847B065C08}" type="datetime1">
               <a:rPr lang="en-US" smtClean="0"/>
-              <a:t>9/2/21</a:t>
+              <a:t>9/13/21</a:t>
             </a:fld>
             <a:endParaRPr lang="en-US"/>
           </a:p>
@@ -2932,7 +2932,7 @@
           <a:p>
             <a:fld id="{FE8A8F49-DF40-F949-8DE2-65B98C5FEDD7}" type="datetime1">
               <a:rPr lang="en-US" smtClean="0"/>
-              <a:t>9/2/21</a:t>
+              <a:t>9/13/21</a:t>
             </a:fld>
             <a:endParaRPr lang="en-US"/>
           </a:p>
@@ -3220,7 +3220,7 @@
           <a:p>
             <a:fld id="{A85EFE4E-DFE8-4C42-98CC-30B935E5C550}" type="datetime1">
               <a:rPr lang="en-US" smtClean="0"/>
-              <a:t>9/2/21</a:t>
+              <a:t>9/13/21</a:t>
             </a:fld>
             <a:endParaRPr lang="en-US"/>
           </a:p>
@@ -3461,7 +3461,7 @@
           <a:p>
             <a:fld id="{5A0C85FA-79DF-354D-A01A-3E5AA821AAF9}" type="datetime1">
               <a:rPr lang="en-US" smtClean="0"/>
-              <a:t>9/2/21</a:t>
+              <a:t>9/13/21</a:t>
             </a:fld>
             <a:endParaRPr lang="en-US"/>
           </a:p>

</xml_diff>

<commit_message>
fall 2022 - session 1
</commit_message>
<xml_diff>
--- a/course slides/week_01.pptx
+++ b/course slides/week_01.pptx
@@ -211,7 +211,7 @@
           <a:p>
             <a:fld id="{E7BF058D-E663-3E48-99D5-AFD0BCA1823C}" type="datetimeFigureOut">
               <a:rPr lang="en-US" smtClean="0"/>
-              <a:t>9/13/21</a:t>
+              <a:t>8/31/22</a:t>
             </a:fld>
             <a:endParaRPr lang="en-US"/>
           </a:p>
@@ -811,7 +811,7 @@
           <a:p>
             <a:fld id="{78A61C02-5DDA-4742-BA9F-16C918E9CF6D}" type="datetime1">
               <a:rPr lang="en-US" smtClean="0"/>
-              <a:t>9/13/21</a:t>
+              <a:t>8/31/22</a:t>
             </a:fld>
             <a:endParaRPr lang="en-US"/>
           </a:p>
@@ -1009,7 +1009,7 @@
           <a:p>
             <a:fld id="{548886B6-90A8-3541-BA71-86E77F56DAB4}" type="datetime1">
               <a:rPr lang="en-US" smtClean="0"/>
-              <a:t>9/13/21</a:t>
+              <a:t>8/31/22</a:t>
             </a:fld>
             <a:endParaRPr lang="en-US"/>
           </a:p>
@@ -1217,7 +1217,7 @@
           <a:p>
             <a:fld id="{852FF3A3-1CCF-A84D-A287-5CAF30DE28F4}" type="datetime1">
               <a:rPr lang="en-US" smtClean="0"/>
-              <a:t>9/13/21</a:t>
+              <a:t>8/31/22</a:t>
             </a:fld>
             <a:endParaRPr lang="en-US"/>
           </a:p>
@@ -1415,7 +1415,7 @@
           <a:p>
             <a:fld id="{8C15019A-578B-EF42-A6FE-609BC777F59C}" type="datetime1">
               <a:rPr lang="en-US" smtClean="0"/>
-              <a:t>9/13/21</a:t>
+              <a:t>8/31/22</a:t>
             </a:fld>
             <a:endParaRPr lang="en-US"/>
           </a:p>
@@ -1690,7 +1690,7 @@
           <a:p>
             <a:fld id="{8CF19FEC-2E87-404D-A86C-ABD7A0A24F55}" type="datetime1">
               <a:rPr lang="en-US" smtClean="0"/>
-              <a:t>9/13/21</a:t>
+              <a:t>8/31/22</a:t>
             </a:fld>
             <a:endParaRPr lang="en-US"/>
           </a:p>
@@ -1955,7 +1955,7 @@
           <a:p>
             <a:fld id="{446EA608-0CB1-7045-BE57-7D86CEA40281}" type="datetime1">
               <a:rPr lang="en-US" smtClean="0"/>
-              <a:t>9/13/21</a:t>
+              <a:t>8/31/22</a:t>
             </a:fld>
             <a:endParaRPr lang="en-US"/>
           </a:p>
@@ -2367,7 +2367,7 @@
           <a:p>
             <a:fld id="{C727496E-E60B-0146-8488-196488F29A43}" type="datetime1">
               <a:rPr lang="en-US" smtClean="0"/>
-              <a:t>9/13/21</a:t>
+              <a:t>8/31/22</a:t>
             </a:fld>
             <a:endParaRPr lang="en-US"/>
           </a:p>
@@ -2508,7 +2508,7 @@
           <a:p>
             <a:fld id="{F546FB0E-EB75-9B48-A4BD-2C5B9A04751D}" type="datetime1">
               <a:rPr lang="en-US" smtClean="0"/>
-              <a:t>9/13/21</a:t>
+              <a:t>8/31/22</a:t>
             </a:fld>
             <a:endParaRPr lang="en-US"/>
           </a:p>
@@ -2621,7 +2621,7 @@
           <a:p>
             <a:fld id="{A456FF61-9A5E-1841-AE70-3D847B065C08}" type="datetime1">
               <a:rPr lang="en-US" smtClean="0"/>
-              <a:t>9/13/21</a:t>
+              <a:t>8/31/22</a:t>
             </a:fld>
             <a:endParaRPr lang="en-US"/>
           </a:p>
@@ -2932,7 +2932,7 @@
           <a:p>
             <a:fld id="{FE8A8F49-DF40-F949-8DE2-65B98C5FEDD7}" type="datetime1">
               <a:rPr lang="en-US" smtClean="0"/>
-              <a:t>9/13/21</a:t>
+              <a:t>8/31/22</a:t>
             </a:fld>
             <a:endParaRPr lang="en-US"/>
           </a:p>
@@ -3220,7 +3220,7 @@
           <a:p>
             <a:fld id="{A85EFE4E-DFE8-4C42-98CC-30B935E5C550}" type="datetime1">
               <a:rPr lang="en-US" smtClean="0"/>
-              <a:t>9/13/21</a:t>
+              <a:t>8/31/22</a:t>
             </a:fld>
             <a:endParaRPr lang="en-US"/>
           </a:p>
@@ -3461,7 +3461,7 @@
           <a:p>
             <a:fld id="{5A0C85FA-79DF-354D-A01A-3E5AA821AAF9}" type="datetime1">
               <a:rPr lang="en-US" smtClean="0"/>
-              <a:t>9/13/21</a:t>
+              <a:t>8/31/22</a:t>
             </a:fld>
             <a:endParaRPr lang="en-US"/>
           </a:p>
@@ -3906,7 +3906,7 @@
               <a:rPr lang="en-US" sz="2800" dirty="0">
                 <a:latin typeface="Garamond" panose="02020404030301010803" pitchFamily="18" charset="0"/>
               </a:rPr>
-              <a:t>INFO 656-01 Fall 2021</a:t>
+              <a:t>INFO 656-01 Fall 2022</a:t>
             </a:r>
             <a:br>
               <a:rPr lang="en-US" b="1" dirty="0">
@@ -4565,13 +4565,13 @@
           <a:p>
             <a:r>
               <a:rPr lang="en-US" dirty="0"/>
-              <a:t>Don’t use Python 2.x – unless you really have to!</a:t>
+              <a:t>Use Python 3.x </a:t>
             </a:r>
           </a:p>
           <a:p>
             <a:r>
               <a:rPr lang="en-US" dirty="0"/>
-              <a:t>Always create/use environments</a:t>
+              <a:t>Always create/use “virtual environments”</a:t>
             </a:r>
           </a:p>
           <a:p>
@@ -4589,7 +4589,7 @@
           <a:p>
             <a:r>
               <a:rPr lang="en-US" dirty="0"/>
-              <a:t>Modular coding</a:t>
+              <a:t>Learn about “modular coding”</a:t>
             </a:r>
           </a:p>
           <a:p>
@@ -4958,11 +4958,17 @@
               <a:t>: </a:t>
             </a:r>
             <a:r>
-              <a:rPr lang="en-US" dirty="0">
+              <a:rPr lang="en-US" dirty="0" err="1">
+                <a:latin typeface="Garamond" panose="02020404030301010803" pitchFamily="18" charset="0"/>
+              </a:rPr>
+              <a:t>a</a:t>
+            </a:r>
+            <a:r>
+              <a:rPr lang="en-US" dirty="0" err="1">
                 <a:latin typeface="Garamond" panose="02020404030301010803" pitchFamily="18" charset="0"/>
                 <a:hlinkClick r:id="rId2"/>
               </a:rPr>
-              <a:t>aimani@pratt.edu</a:t>
+              <a:t>imani@pratt.edu</a:t>
             </a:r>
             <a:endParaRPr lang="en-US" dirty="0">
               <a:latin typeface="Garamond" panose="02020404030301010803" pitchFamily="18" charset="0"/>
@@ -4982,7 +4988,7 @@
               <a:rPr lang="en-US" dirty="0">
                 <a:latin typeface="Garamond" panose="02020404030301010803" pitchFamily="18" charset="0"/>
               </a:rPr>
-              <a:t>: Mondays 7-9. Email me first!</a:t>
+              <a:t>: TBD – you can always email me.</a:t>
             </a:r>
           </a:p>
           <a:p>
@@ -5147,7 +5153,7 @@
         <p:spPr/>
         <p:txBody>
           <a:bodyPr>
-            <a:normAutofit lnSpcReduction="10000"/>
+            <a:normAutofit/>
           </a:bodyPr>
           <a:lstStyle/>
           <a:p>
@@ -5208,30 +5214,6 @@
               </a:rPr>
               <a:t>Guest lecturers</a:t>
             </a:r>
-          </a:p>
-          <a:p>
-            <a:endParaRPr lang="en-US" sz="2400" dirty="0">
-              <a:latin typeface="Garamond" panose="02020404030301010803" pitchFamily="18" charset="0"/>
-            </a:endParaRPr>
-          </a:p>
-          <a:p>
-            <a:pPr marL="0" indent="0">
-              <a:buNone/>
-            </a:pPr>
-            <a:r>
-              <a:rPr lang="en-US" sz="2400" dirty="0">
-                <a:latin typeface="Garamond" panose="02020404030301010803" pitchFamily="18" charset="0"/>
-              </a:rPr>
-              <a:t>Class discussion (30%)+ 4 Lab Assignments (20%)+ Final Project (10%+30%+10%)</a:t>
-            </a:r>
-          </a:p>
-          <a:p>
-            <a:pPr marL="0" indent="0">
-              <a:buNone/>
-            </a:pPr>
-            <a:endParaRPr lang="en-US" sz="2400" dirty="0">
-              <a:latin typeface="Garamond" panose="02020404030301010803" pitchFamily="18" charset="0"/>
-            </a:endParaRPr>
           </a:p>
           <a:p>
             <a:pPr marL="0" indent="0">

</xml_diff>

<commit_message>
updated week 1 and 2 slides
</commit_message>
<xml_diff>
--- a/course slides/week_01.pptx
+++ b/course slides/week_01.pptx
@@ -77,13 +77,13 @@
         </a:solidFill>
         <a:effectLst/>
         <a:uFillTx/>
-        <a:latin typeface="Garamond"/>
-        <a:ea typeface="Garamond"/>
-        <a:cs typeface="Garamond"/>
-        <a:sym typeface="Garamond"/>
+        <a:latin typeface="+mj-lt"/>
+        <a:ea typeface="+mj-ea"/>
+        <a:cs typeface="+mj-cs"/>
+        <a:sym typeface="Calibri"/>
       </a:defRPr>
     </a:lvl1pPr>
-    <a:lvl2pPr marL="0" marR="0" indent="457200" algn="l" defTabSz="914400" rtl="0" fontAlgn="auto" latinLnBrk="0" hangingPunct="0">
+    <a:lvl2pPr marL="0" marR="0" indent="0" algn="l" defTabSz="914400" rtl="0" fontAlgn="auto" latinLnBrk="0" hangingPunct="0">
       <a:lnSpc>
         <a:spcPct val="100000"/>
       </a:lnSpc>
@@ -107,13 +107,13 @@
         </a:solidFill>
         <a:effectLst/>
         <a:uFillTx/>
-        <a:latin typeface="Garamond"/>
-        <a:ea typeface="Garamond"/>
-        <a:cs typeface="Garamond"/>
-        <a:sym typeface="Garamond"/>
+        <a:latin typeface="+mj-lt"/>
+        <a:ea typeface="+mj-ea"/>
+        <a:cs typeface="+mj-cs"/>
+        <a:sym typeface="Calibri"/>
       </a:defRPr>
     </a:lvl2pPr>
-    <a:lvl3pPr marL="0" marR="0" indent="914400" algn="l" defTabSz="914400" rtl="0" fontAlgn="auto" latinLnBrk="0" hangingPunct="0">
+    <a:lvl3pPr marL="0" marR="0" indent="0" algn="l" defTabSz="914400" rtl="0" fontAlgn="auto" latinLnBrk="0" hangingPunct="0">
       <a:lnSpc>
         <a:spcPct val="100000"/>
       </a:lnSpc>
@@ -137,13 +137,13 @@
         </a:solidFill>
         <a:effectLst/>
         <a:uFillTx/>
-        <a:latin typeface="Garamond"/>
-        <a:ea typeface="Garamond"/>
-        <a:cs typeface="Garamond"/>
-        <a:sym typeface="Garamond"/>
+        <a:latin typeface="+mj-lt"/>
+        <a:ea typeface="+mj-ea"/>
+        <a:cs typeface="+mj-cs"/>
+        <a:sym typeface="Calibri"/>
       </a:defRPr>
     </a:lvl3pPr>
-    <a:lvl4pPr marL="0" marR="0" indent="1371600" algn="l" defTabSz="914400" rtl="0" fontAlgn="auto" latinLnBrk="0" hangingPunct="0">
+    <a:lvl4pPr marL="0" marR="0" indent="0" algn="l" defTabSz="914400" rtl="0" fontAlgn="auto" latinLnBrk="0" hangingPunct="0">
       <a:lnSpc>
         <a:spcPct val="100000"/>
       </a:lnSpc>
@@ -167,13 +167,13 @@
         </a:solidFill>
         <a:effectLst/>
         <a:uFillTx/>
-        <a:latin typeface="Garamond"/>
-        <a:ea typeface="Garamond"/>
-        <a:cs typeface="Garamond"/>
-        <a:sym typeface="Garamond"/>
+        <a:latin typeface="+mj-lt"/>
+        <a:ea typeface="+mj-ea"/>
+        <a:cs typeface="+mj-cs"/>
+        <a:sym typeface="Calibri"/>
       </a:defRPr>
     </a:lvl4pPr>
-    <a:lvl5pPr marL="0" marR="0" indent="1828800" algn="l" defTabSz="914400" rtl="0" fontAlgn="auto" latinLnBrk="0" hangingPunct="0">
+    <a:lvl5pPr marL="0" marR="0" indent="0" algn="l" defTabSz="914400" rtl="0" fontAlgn="auto" latinLnBrk="0" hangingPunct="0">
       <a:lnSpc>
         <a:spcPct val="100000"/>
       </a:lnSpc>
@@ -197,13 +197,13 @@
         </a:solidFill>
         <a:effectLst/>
         <a:uFillTx/>
-        <a:latin typeface="Garamond"/>
-        <a:ea typeface="Garamond"/>
-        <a:cs typeface="Garamond"/>
-        <a:sym typeface="Garamond"/>
+        <a:latin typeface="+mj-lt"/>
+        <a:ea typeface="+mj-ea"/>
+        <a:cs typeface="+mj-cs"/>
+        <a:sym typeface="Calibri"/>
       </a:defRPr>
     </a:lvl5pPr>
-    <a:lvl6pPr marL="0" marR="0" indent="2286000" algn="l" defTabSz="914400" rtl="0" fontAlgn="auto" latinLnBrk="0" hangingPunct="0">
+    <a:lvl6pPr marL="0" marR="0" indent="0" algn="l" defTabSz="914400" rtl="0" fontAlgn="auto" latinLnBrk="0" hangingPunct="0">
       <a:lnSpc>
         <a:spcPct val="100000"/>
       </a:lnSpc>
@@ -227,13 +227,13 @@
         </a:solidFill>
         <a:effectLst/>
         <a:uFillTx/>
-        <a:latin typeface="Garamond"/>
-        <a:ea typeface="Garamond"/>
-        <a:cs typeface="Garamond"/>
-        <a:sym typeface="Garamond"/>
+        <a:latin typeface="+mj-lt"/>
+        <a:ea typeface="+mj-ea"/>
+        <a:cs typeface="+mj-cs"/>
+        <a:sym typeface="Calibri"/>
       </a:defRPr>
     </a:lvl6pPr>
-    <a:lvl7pPr marL="0" marR="0" indent="2743200" algn="l" defTabSz="914400" rtl="0" fontAlgn="auto" latinLnBrk="0" hangingPunct="0">
+    <a:lvl7pPr marL="0" marR="0" indent="0" algn="l" defTabSz="914400" rtl="0" fontAlgn="auto" latinLnBrk="0" hangingPunct="0">
       <a:lnSpc>
         <a:spcPct val="100000"/>
       </a:lnSpc>
@@ -257,13 +257,13 @@
         </a:solidFill>
         <a:effectLst/>
         <a:uFillTx/>
-        <a:latin typeface="Garamond"/>
-        <a:ea typeface="Garamond"/>
-        <a:cs typeface="Garamond"/>
-        <a:sym typeface="Garamond"/>
+        <a:latin typeface="+mj-lt"/>
+        <a:ea typeface="+mj-ea"/>
+        <a:cs typeface="+mj-cs"/>
+        <a:sym typeface="Calibri"/>
       </a:defRPr>
     </a:lvl7pPr>
-    <a:lvl8pPr marL="0" marR="0" indent="3200400" algn="l" defTabSz="914400" rtl="0" fontAlgn="auto" latinLnBrk="0" hangingPunct="0">
+    <a:lvl8pPr marL="0" marR="0" indent="0" algn="l" defTabSz="914400" rtl="0" fontAlgn="auto" latinLnBrk="0" hangingPunct="0">
       <a:lnSpc>
         <a:spcPct val="100000"/>
       </a:lnSpc>
@@ -287,13 +287,13 @@
         </a:solidFill>
         <a:effectLst/>
         <a:uFillTx/>
-        <a:latin typeface="Garamond"/>
-        <a:ea typeface="Garamond"/>
-        <a:cs typeface="Garamond"/>
-        <a:sym typeface="Garamond"/>
+        <a:latin typeface="+mj-lt"/>
+        <a:ea typeface="+mj-ea"/>
+        <a:cs typeface="+mj-cs"/>
+        <a:sym typeface="Calibri"/>
       </a:defRPr>
     </a:lvl8pPr>
-    <a:lvl9pPr marL="0" marR="0" indent="3657600" algn="l" defTabSz="914400" rtl="0" fontAlgn="auto" latinLnBrk="0" hangingPunct="0">
+    <a:lvl9pPr marL="0" marR="0" indent="0" algn="l" defTabSz="914400" rtl="0" fontAlgn="auto" latinLnBrk="0" hangingPunct="0">
       <a:lnSpc>
         <a:spcPct val="100000"/>
       </a:lnSpc>
@@ -317,10 +317,10 @@
         </a:solidFill>
         <a:effectLst/>
         <a:uFillTx/>
-        <a:latin typeface="Garamond"/>
-        <a:ea typeface="Garamond"/>
-        <a:cs typeface="Garamond"/>
-        <a:sym typeface="Garamond"/>
+        <a:latin typeface="+mj-lt"/>
+        <a:ea typeface="+mj-ea"/>
+        <a:cs typeface="+mj-cs"/>
+        <a:sym typeface="Calibri"/>
       </a:defRPr>
     </a:lvl9pPr>
   </p:defaultTextStyle>
@@ -404,73 +404,73 @@
   <p:notesStyle>
     <a:lvl1pPr latinLnBrk="0">
       <a:defRPr sz="1200">
-        <a:latin typeface="+mn-lt"/>
-        <a:ea typeface="+mn-ea"/>
-        <a:cs typeface="+mn-cs"/>
+        <a:latin typeface="+mj-lt"/>
+        <a:ea typeface="+mj-ea"/>
+        <a:cs typeface="+mj-cs"/>
         <a:sym typeface="Calibri"/>
       </a:defRPr>
     </a:lvl1pPr>
     <a:lvl2pPr indent="228600" latinLnBrk="0">
       <a:defRPr sz="1200">
-        <a:latin typeface="+mn-lt"/>
-        <a:ea typeface="+mn-ea"/>
-        <a:cs typeface="+mn-cs"/>
+        <a:latin typeface="+mj-lt"/>
+        <a:ea typeface="+mj-ea"/>
+        <a:cs typeface="+mj-cs"/>
         <a:sym typeface="Calibri"/>
       </a:defRPr>
     </a:lvl2pPr>
     <a:lvl3pPr indent="457200" latinLnBrk="0">
       <a:defRPr sz="1200">
-        <a:latin typeface="+mn-lt"/>
-        <a:ea typeface="+mn-ea"/>
-        <a:cs typeface="+mn-cs"/>
+        <a:latin typeface="+mj-lt"/>
+        <a:ea typeface="+mj-ea"/>
+        <a:cs typeface="+mj-cs"/>
         <a:sym typeface="Calibri"/>
       </a:defRPr>
     </a:lvl3pPr>
     <a:lvl4pPr indent="685800" latinLnBrk="0">
       <a:defRPr sz="1200">
-        <a:latin typeface="+mn-lt"/>
-        <a:ea typeface="+mn-ea"/>
-        <a:cs typeface="+mn-cs"/>
+        <a:latin typeface="+mj-lt"/>
+        <a:ea typeface="+mj-ea"/>
+        <a:cs typeface="+mj-cs"/>
         <a:sym typeface="Calibri"/>
       </a:defRPr>
     </a:lvl4pPr>
     <a:lvl5pPr indent="914400" latinLnBrk="0">
       <a:defRPr sz="1200">
-        <a:latin typeface="+mn-lt"/>
-        <a:ea typeface="+mn-ea"/>
-        <a:cs typeface="+mn-cs"/>
+        <a:latin typeface="+mj-lt"/>
+        <a:ea typeface="+mj-ea"/>
+        <a:cs typeface="+mj-cs"/>
         <a:sym typeface="Calibri"/>
       </a:defRPr>
     </a:lvl5pPr>
     <a:lvl6pPr indent="1143000" latinLnBrk="0">
       <a:defRPr sz="1200">
-        <a:latin typeface="+mn-lt"/>
-        <a:ea typeface="+mn-ea"/>
-        <a:cs typeface="+mn-cs"/>
+        <a:latin typeface="+mj-lt"/>
+        <a:ea typeface="+mj-ea"/>
+        <a:cs typeface="+mj-cs"/>
         <a:sym typeface="Calibri"/>
       </a:defRPr>
     </a:lvl6pPr>
     <a:lvl7pPr indent="1371600" latinLnBrk="0">
       <a:defRPr sz="1200">
-        <a:latin typeface="+mn-lt"/>
-        <a:ea typeface="+mn-ea"/>
-        <a:cs typeface="+mn-cs"/>
+        <a:latin typeface="+mj-lt"/>
+        <a:ea typeface="+mj-ea"/>
+        <a:cs typeface="+mj-cs"/>
         <a:sym typeface="Calibri"/>
       </a:defRPr>
     </a:lvl7pPr>
     <a:lvl8pPr indent="1600200" latinLnBrk="0">
       <a:defRPr sz="1200">
-        <a:latin typeface="+mn-lt"/>
-        <a:ea typeface="+mn-ea"/>
-        <a:cs typeface="+mn-cs"/>
+        <a:latin typeface="+mj-lt"/>
+        <a:ea typeface="+mj-ea"/>
+        <a:cs typeface="+mj-cs"/>
         <a:sym typeface="Calibri"/>
       </a:defRPr>
     </a:lvl8pPr>
     <a:lvl9pPr indent="1828800" latinLnBrk="0">
       <a:defRPr sz="1200">
-        <a:latin typeface="+mn-lt"/>
-        <a:ea typeface="+mn-ea"/>
-        <a:cs typeface="+mn-cs"/>
+        <a:latin typeface="+mj-lt"/>
+        <a:ea typeface="+mj-ea"/>
+        <a:cs typeface="+mj-cs"/>
         <a:sym typeface="Calibri"/>
       </a:defRPr>
     </a:lvl9pPr>
@@ -623,7 +623,7 @@
         <p:spPr>
           <a:xfrm>
             <a:off x="1524000" y="3602037"/>
-            <a:ext cx="9144000" cy="1655763"/>
+            <a:ext cx="9144000" cy="1655764"/>
           </a:xfrm>
           <a:prstGeom prst="rect">
             <a:avLst/>
@@ -638,25 +638,25 @@
               <a:buNone/>
               <a:defRPr sz="2400"/>
             </a:lvl1pPr>
-            <a:lvl2pPr marL="0" indent="457200" algn="ctr">
+            <a:lvl2pPr marL="0" indent="0" algn="ctr">
               <a:buSzTx/>
               <a:buFontTx/>
               <a:buNone/>
               <a:defRPr sz="2400"/>
             </a:lvl2pPr>
-            <a:lvl3pPr marL="0" indent="914400" algn="ctr">
+            <a:lvl3pPr marL="0" indent="0" algn="ctr">
               <a:buSzTx/>
               <a:buFontTx/>
               <a:buNone/>
               <a:defRPr sz="2400"/>
             </a:lvl3pPr>
-            <a:lvl4pPr marL="0" indent="1371600" algn="ctr">
+            <a:lvl4pPr marL="0" indent="0" algn="ctr">
               <a:buSzTx/>
               <a:buFontTx/>
               <a:buNone/>
               <a:defRPr sz="2400"/>
             </a:lvl4pPr>
-            <a:lvl5pPr marL="0" indent="1828800" algn="ctr">
+            <a:lvl5pPr marL="0" indent="0" algn="ctr">
               <a:buSzTx/>
               <a:buFontTx/>
               <a:buNone/>
@@ -906,7 +906,7 @@
         <p:spPr>
           <a:xfrm>
             <a:off x="831850" y="4589462"/>
-            <a:ext cx="10515600" cy="1500188"/>
+            <a:ext cx="10515600" cy="1500189"/>
           </a:xfrm>
           <a:prstGeom prst="rect">
             <a:avLst/>
@@ -925,7 +925,7 @@
                 </a:solidFill>
               </a:defRPr>
             </a:lvl1pPr>
-            <a:lvl2pPr marL="0" indent="457200">
+            <a:lvl2pPr marL="0" indent="0">
               <a:buSzTx/>
               <a:buFontTx/>
               <a:buNone/>
@@ -935,7 +935,7 @@
                 </a:solidFill>
               </a:defRPr>
             </a:lvl2pPr>
-            <a:lvl3pPr marL="0" indent="914400">
+            <a:lvl3pPr marL="0" indent="0">
               <a:buSzTx/>
               <a:buFontTx/>
               <a:buNone/>
@@ -945,7 +945,7 @@
                 </a:solidFill>
               </a:defRPr>
             </a:lvl3pPr>
-            <a:lvl4pPr marL="0" indent="1371600">
+            <a:lvl4pPr marL="0" indent="0">
               <a:buSzTx/>
               <a:buFontTx/>
               <a:buNone/>
@@ -955,7 +955,7 @@
                 </a:solidFill>
               </a:defRPr>
             </a:lvl4pPr>
-            <a:lvl5pPr marL="0" indent="1828800">
+            <a:lvl5pPr marL="0" indent="0">
               <a:buSzTx/>
               <a:buFontTx/>
               <a:buNone/>
@@ -1209,7 +1209,7 @@
         <p:spPr>
           <a:xfrm>
             <a:off x="839787" y="1681163"/>
-            <a:ext cx="5157789" cy="823913"/>
+            <a:ext cx="5157790" cy="823914"/>
           </a:xfrm>
           <a:prstGeom prst="rect">
             <a:avLst/>
@@ -1224,25 +1224,25 @@
               <a:buNone/>
               <a:defRPr b="1" sz="2400"/>
             </a:lvl1pPr>
-            <a:lvl2pPr marL="0" indent="457200">
+            <a:lvl2pPr marL="0" indent="0">
               <a:buSzTx/>
               <a:buFontTx/>
               <a:buNone/>
               <a:defRPr b="1" sz="2400"/>
             </a:lvl2pPr>
-            <a:lvl3pPr marL="0" indent="914400">
+            <a:lvl3pPr marL="0" indent="0">
               <a:buSzTx/>
               <a:buFontTx/>
               <a:buNone/>
               <a:defRPr b="1" sz="2400"/>
             </a:lvl3pPr>
-            <a:lvl4pPr marL="0" indent="1371600">
+            <a:lvl4pPr marL="0" indent="0">
               <a:buSzTx/>
               <a:buFontTx/>
               <a:buNone/>
               <a:defRPr b="1" sz="2400"/>
             </a:lvl4pPr>
-            <a:lvl5pPr marL="0" indent="1828800">
+            <a:lvl5pPr marL="0" indent="0">
               <a:buSzTx/>
               <a:buFontTx/>
               <a:buNone/>
@@ -1292,7 +1292,7 @@
         <p:spPr>
           <a:xfrm>
             <a:off x="6172200" y="1681163"/>
-            <a:ext cx="5183188" cy="823913"/>
+            <a:ext cx="5183188" cy="823914"/>
           </a:xfrm>
           <a:prstGeom prst="rect">
             <a:avLst/>
@@ -1302,12 +1302,7 @@
           <a:bodyPr anchor="b"/>
           <a:lstStyle/>
           <a:p>
-            <a:pPr marL="0" indent="0">
-              <a:buSzTx/>
-              <a:buFontTx/>
-              <a:buNone/>
-              <a:defRPr b="1" sz="2400"/>
-            </a:pPr>
+            <a:pPr/>
           </a:p>
         </p:txBody>
       </p:sp>
@@ -1490,7 +1485,7 @@
         <p:spPr>
           <a:xfrm>
             <a:off x="839787" y="457200"/>
-            <a:ext cx="3932239" cy="1600200"/>
+            <a:ext cx="3932240" cy="1600200"/>
           </a:xfrm>
           <a:prstGeom prst="rect">
             <a:avLst/>
@@ -1522,7 +1517,7 @@
         <p:spPr>
           <a:xfrm>
             <a:off x="5183187" y="987425"/>
-            <a:ext cx="6172201" cy="4873625"/>
+            <a:ext cx="6172202" cy="4873625"/>
           </a:xfrm>
           <a:prstGeom prst="rect">
             <a:avLst/>
@@ -1600,12 +1595,7 @@
           <a:bodyPr/>
           <a:lstStyle/>
           <a:p>
-            <a:pPr marL="0" indent="0">
-              <a:buSzTx/>
-              <a:buFontTx/>
-              <a:buNone/>
-              <a:defRPr sz="1600"/>
-            </a:pPr>
+            <a:pPr/>
           </a:p>
         </p:txBody>
       </p:sp>
@@ -1668,7 +1658,7 @@
         <p:spPr>
           <a:xfrm>
             <a:off x="839787" y="457200"/>
-            <a:ext cx="3932239" cy="1600200"/>
+            <a:ext cx="3932240" cy="1600200"/>
           </a:xfrm>
           <a:prstGeom prst="rect">
             <a:avLst/>
@@ -1700,14 +1690,14 @@
         <p:spPr>
           <a:xfrm>
             <a:off x="5183187" y="987425"/>
-            <a:ext cx="6172201" cy="4873625"/>
+            <a:ext cx="6172202" cy="4873625"/>
           </a:xfrm>
           <a:prstGeom prst="rect">
             <a:avLst/>
           </a:prstGeom>
         </p:spPr>
         <p:txBody>
-          <a:bodyPr lIns="91439" rIns="91439">
+          <a:bodyPr lIns="91439" tIns="45719" rIns="91439" bIns="45719">
             <a:noAutofit/>
           </a:bodyPr>
           <a:lstStyle/>
@@ -1727,7 +1717,7 @@
         <p:spPr>
           <a:xfrm>
             <a:off x="839787" y="2057400"/>
-            <a:ext cx="3932239" cy="3811588"/>
+            <a:ext cx="3932240" cy="3811588"/>
           </a:xfrm>
           <a:prstGeom prst="rect">
             <a:avLst/>
@@ -1742,25 +1732,25 @@
               <a:buNone/>
               <a:defRPr sz="1600"/>
             </a:lvl1pPr>
-            <a:lvl2pPr marL="0" indent="457200">
+            <a:lvl2pPr marL="0" indent="0">
               <a:buSzTx/>
               <a:buFontTx/>
               <a:buNone/>
               <a:defRPr sz="1600"/>
             </a:lvl2pPr>
-            <a:lvl3pPr marL="0" indent="914400">
+            <a:lvl3pPr marL="0" indent="0">
               <a:buSzTx/>
               <a:buFontTx/>
               <a:buNone/>
               <a:defRPr sz="1600"/>
             </a:lvl3pPr>
-            <a:lvl4pPr marL="0" indent="1371600">
+            <a:lvl4pPr marL="0" indent="0">
               <a:buSzTx/>
               <a:buFontTx/>
               <a:buNone/>
               <a:defRPr sz="1600"/>
             </a:lvl4pPr>
-            <a:lvl5pPr marL="0" indent="1828800">
+            <a:lvl5pPr marL="0" indent="0">
               <a:buSzTx/>
               <a:buFontTx/>
               <a:buNone/>
@@ -1880,7 +1870,7 @@
           </a:extLst>
         </p:spPr>
         <p:txBody>
-          <a:bodyPr lIns="45719" rIns="45719" anchor="ctr">
+          <a:bodyPr lIns="45718" tIns="45718" rIns="45718" bIns="45718" anchor="ctr">
             <a:normAutofit fontScale="100000" lnSpcReduction="0"/>
           </a:bodyPr>
           <a:lstStyle/>
@@ -1918,7 +1908,7 @@
           </a:extLst>
         </p:spPr>
         <p:txBody>
-          <a:bodyPr lIns="45719" rIns="45719">
+          <a:bodyPr lIns="45718" tIns="45718" rIns="45718" bIns="45718">
             <a:normAutofit fontScale="100000" lnSpcReduction="0"/>
           </a:bodyPr>
           <a:lstStyle/>
@@ -1964,8 +1954,8 @@
         </p:nvSpPr>
         <p:spPr>
           <a:xfrm>
-            <a:off x="11106785" y="6410642"/>
-            <a:ext cx="247015" cy="256541"/>
+            <a:off x="11106786" y="6410643"/>
+            <a:ext cx="247014" cy="256539"/>
           </a:xfrm>
           <a:prstGeom prst="rect">
             <a:avLst/>
@@ -1975,7 +1965,7 @@
           </a:ln>
         </p:spPr>
         <p:txBody>
-          <a:bodyPr wrap="none" lIns="45719" rIns="45719" anchor="ctr">
+          <a:bodyPr wrap="none" lIns="45718" tIns="45718" rIns="45718" bIns="45718" anchor="ctr">
             <a:spAutoFit/>
           </a:bodyPr>
           <a:lstStyle>
@@ -1984,6 +1974,10 @@
                 <a:solidFill>
                   <a:srgbClr val="888888"/>
                 </a:solidFill>
+                <a:latin typeface="Garamond"/>
+                <a:ea typeface="Garamond"/>
+                <a:cs typeface="Garamond"/>
+                <a:sym typeface="Garamond"/>
               </a:defRPr>
             </a:lvl1pPr>
           </a:lstStyle>
@@ -2298,7 +2292,7 @@
           <a:sym typeface="Garamond"/>
         </a:defRPr>
       </a:lvl2pPr>
-      <a:lvl3pPr marL="1234439" marR="0" indent="-320039" algn="l" defTabSz="914400" rtl="0" latinLnBrk="0">
+      <a:lvl3pPr marL="1234438" marR="0" indent="-320038" algn="l" defTabSz="914400" rtl="0" latinLnBrk="0">
         <a:lnSpc>
           <a:spcPct val="90000"/>
         </a:lnSpc>
@@ -2508,7 +2502,7 @@
           <a:sym typeface="Garamond"/>
         </a:defRPr>
       </a:lvl1pPr>
-      <a:lvl2pPr marL="0" marR="0" indent="457200" algn="r" defTabSz="914400" rtl="0" latinLnBrk="0">
+      <a:lvl2pPr marL="0" marR="0" indent="0" algn="r" defTabSz="914400" rtl="0" latinLnBrk="0">
         <a:lnSpc>
           <a:spcPct val="100000"/>
         </a:lnSpc>
@@ -2534,7 +2528,7 @@
           <a:sym typeface="Garamond"/>
         </a:defRPr>
       </a:lvl2pPr>
-      <a:lvl3pPr marL="0" marR="0" indent="914400" algn="r" defTabSz="914400" rtl="0" latinLnBrk="0">
+      <a:lvl3pPr marL="0" marR="0" indent="0" algn="r" defTabSz="914400" rtl="0" latinLnBrk="0">
         <a:lnSpc>
           <a:spcPct val="100000"/>
         </a:lnSpc>
@@ -2560,7 +2554,7 @@
           <a:sym typeface="Garamond"/>
         </a:defRPr>
       </a:lvl3pPr>
-      <a:lvl4pPr marL="0" marR="0" indent="1371600" algn="r" defTabSz="914400" rtl="0" latinLnBrk="0">
+      <a:lvl4pPr marL="0" marR="0" indent="0" algn="r" defTabSz="914400" rtl="0" latinLnBrk="0">
         <a:lnSpc>
           <a:spcPct val="100000"/>
         </a:lnSpc>
@@ -2586,7 +2580,7 @@
           <a:sym typeface="Garamond"/>
         </a:defRPr>
       </a:lvl4pPr>
-      <a:lvl5pPr marL="0" marR="0" indent="1828800" algn="r" defTabSz="914400" rtl="0" latinLnBrk="0">
+      <a:lvl5pPr marL="0" marR="0" indent="0" algn="r" defTabSz="914400" rtl="0" latinLnBrk="0">
         <a:lnSpc>
           <a:spcPct val="100000"/>
         </a:lnSpc>
@@ -2612,7 +2606,7 @@
           <a:sym typeface="Garamond"/>
         </a:defRPr>
       </a:lvl5pPr>
-      <a:lvl6pPr marL="0" marR="0" indent="2286000" algn="r" defTabSz="914400" rtl="0" latinLnBrk="0">
+      <a:lvl6pPr marL="0" marR="0" indent="0" algn="r" defTabSz="914400" rtl="0" latinLnBrk="0">
         <a:lnSpc>
           <a:spcPct val="100000"/>
         </a:lnSpc>
@@ -2638,7 +2632,7 @@
           <a:sym typeface="Garamond"/>
         </a:defRPr>
       </a:lvl6pPr>
-      <a:lvl7pPr marL="0" marR="0" indent="2743200" algn="r" defTabSz="914400" rtl="0" latinLnBrk="0">
+      <a:lvl7pPr marL="0" marR="0" indent="0" algn="r" defTabSz="914400" rtl="0" latinLnBrk="0">
         <a:lnSpc>
           <a:spcPct val="100000"/>
         </a:lnSpc>
@@ -2664,7 +2658,7 @@
           <a:sym typeface="Garamond"/>
         </a:defRPr>
       </a:lvl7pPr>
-      <a:lvl8pPr marL="0" marR="0" indent="3200400" algn="r" defTabSz="914400" rtl="0" latinLnBrk="0">
+      <a:lvl8pPr marL="0" marR="0" indent="0" algn="r" defTabSz="914400" rtl="0" latinLnBrk="0">
         <a:lnSpc>
           <a:spcPct val="100000"/>
         </a:lnSpc>
@@ -2690,7 +2684,7 @@
           <a:sym typeface="Garamond"/>
         </a:defRPr>
       </a:lvl8pPr>
-      <a:lvl9pPr marL="0" marR="0" indent="3657600" algn="r" defTabSz="914400" rtl="0" latinLnBrk="0">
+      <a:lvl9pPr marL="0" marR="0" indent="0" algn="r" defTabSz="914400" rtl="0" latinLnBrk="0">
         <a:lnSpc>
           <a:spcPct val="100000"/>
         </a:lnSpc>
@@ -2747,6 +2741,10 @@
           </p:nvPr>
         </p:nvSpPr>
         <p:spPr>
+          <a:xfrm>
+            <a:off x="1524000" y="1122362"/>
+            <a:ext cx="9144000" cy="2387601"/>
+          </a:xfrm>
           <a:prstGeom prst="rect">
             <a:avLst/>
           </a:prstGeom>
@@ -2839,6 +2837,10 @@
           </p:nvPr>
         </p:nvSpPr>
         <p:spPr>
+          <a:xfrm>
+            <a:off x="838200" y="365125"/>
+            <a:ext cx="10515600" cy="1325563"/>
+          </a:xfrm>
           <a:prstGeom prst="rect">
             <a:avLst/>
           </a:prstGeom>
@@ -2863,6 +2865,10 @@
           </p:nvPr>
         </p:nvSpPr>
         <p:spPr>
+          <a:xfrm>
+            <a:off x="838200" y="1825625"/>
+            <a:ext cx="10515600" cy="4351338"/>
+          </a:xfrm>
           <a:prstGeom prst="rect">
             <a:avLst/>
           </a:prstGeom>
@@ -2925,6 +2931,10 @@
           </p:nvPr>
         </p:nvSpPr>
         <p:spPr>
+          <a:xfrm>
+            <a:off x="838200" y="365125"/>
+            <a:ext cx="10515600" cy="1325563"/>
+          </a:xfrm>
           <a:prstGeom prst="rect">
             <a:avLst/>
           </a:prstGeom>
@@ -2949,6 +2959,10 @@
           </p:nvPr>
         </p:nvSpPr>
         <p:spPr>
+          <a:xfrm>
+            <a:off x="838200" y="1825625"/>
+            <a:ext cx="10515600" cy="4351338"/>
+          </a:xfrm>
           <a:prstGeom prst="rect">
             <a:avLst/>
           </a:prstGeom>
@@ -3007,7 +3021,7 @@
         <p:spPr>
           <a:xfrm>
             <a:off x="7066156" y="0"/>
-            <a:ext cx="5125845" cy="7226017"/>
+            <a:ext cx="5125846" cy="7226018"/>
           </a:xfrm>
           <a:prstGeom prst="rect">
             <a:avLst/>
@@ -3051,8 +3065,8 @@
         </p:nvSpPr>
         <p:spPr>
           <a:xfrm>
-            <a:off x="350520" y="6383656"/>
-            <a:ext cx="7757160" cy="256541"/>
+            <a:off x="350520" y="6383657"/>
+            <a:ext cx="7757160" cy="256539"/>
           </a:xfrm>
           <a:prstGeom prst="rect">
             <a:avLst/>
@@ -3067,7 +3081,7 @@
           </a:extLst>
         </p:spPr>
         <p:txBody>
-          <a:bodyPr lIns="45719" rIns="45719" anchor="ctr">
+          <a:bodyPr lIns="45718" tIns="45718" rIns="45718" bIns="45718" anchor="ctr">
             <a:spAutoFit/>
           </a:bodyPr>
           <a:lstStyle>
@@ -3076,6 +3090,10 @@
                 <a:solidFill>
                   <a:srgbClr val="888888"/>
                 </a:solidFill>
+                <a:latin typeface="Garamond"/>
+                <a:ea typeface="Garamond"/>
+                <a:cs typeface="Garamond"/>
+                <a:sym typeface="Garamond"/>
               </a:defRPr>
             </a:lvl1pPr>
           </a:lstStyle>
@@ -3096,6 +3114,10 @@
           </p:nvPr>
         </p:nvSpPr>
         <p:spPr>
+          <a:xfrm>
+            <a:off x="838200" y="365125"/>
+            <a:ext cx="10515600" cy="1325563"/>
+          </a:xfrm>
           <a:prstGeom prst="rect">
             <a:avLst/>
           </a:prstGeom>
@@ -3120,6 +3142,10 @@
           </p:nvPr>
         </p:nvSpPr>
         <p:spPr>
+          <a:xfrm>
+            <a:off x="838200" y="1825625"/>
+            <a:ext cx="10515600" cy="4351338"/>
+          </a:xfrm>
           <a:prstGeom prst="rect">
             <a:avLst/>
           </a:prstGeom>
@@ -3196,7 +3222,7 @@
         <p:spPr>
           <a:xfrm>
             <a:off x="6371723" y="1414462"/>
-            <a:ext cx="5554441" cy="4762501"/>
+            <a:ext cx="5554441" cy="4762502"/>
           </a:xfrm>
           <a:prstGeom prst="rect">
             <a:avLst/>
@@ -3241,6 +3267,10 @@
           </p:nvPr>
         </p:nvSpPr>
         <p:spPr>
+          <a:xfrm>
+            <a:off x="838200" y="365125"/>
+            <a:ext cx="10515600" cy="1325563"/>
+          </a:xfrm>
           <a:prstGeom prst="rect">
             <a:avLst/>
           </a:prstGeom>
@@ -3265,6 +3295,10 @@
           </p:nvPr>
         </p:nvSpPr>
         <p:spPr>
+          <a:xfrm>
+            <a:off x="838200" y="1825625"/>
+            <a:ext cx="10515600" cy="4351338"/>
+          </a:xfrm>
           <a:prstGeom prst="rect">
             <a:avLst/>
           </a:prstGeom>
@@ -3374,6 +3408,10 @@
           </p:nvPr>
         </p:nvSpPr>
         <p:spPr>
+          <a:xfrm>
+            <a:off x="838200" y="365125"/>
+            <a:ext cx="10515600" cy="1325563"/>
+          </a:xfrm>
           <a:prstGeom prst="rect">
             <a:avLst/>
           </a:prstGeom>
@@ -3424,6 +3462,10 @@
           </p:nvPr>
         </p:nvSpPr>
         <p:spPr>
+          <a:xfrm>
+            <a:off x="838200" y="365125"/>
+            <a:ext cx="10515600" cy="1325563"/>
+          </a:xfrm>
           <a:prstGeom prst="rect">
             <a:avLst/>
           </a:prstGeom>
@@ -3448,6 +3490,10 @@
           </p:nvPr>
         </p:nvSpPr>
         <p:spPr>
+          <a:xfrm>
+            <a:off x="838200" y="1825625"/>
+            <a:ext cx="10515600" cy="4351338"/>
+          </a:xfrm>
           <a:prstGeom prst="rect">
             <a:avLst/>
           </a:prstGeom>
@@ -3495,6 +3541,10 @@
           </p:nvPr>
         </p:nvSpPr>
         <p:spPr>
+          <a:xfrm>
+            <a:off x="838200" y="365125"/>
+            <a:ext cx="10515600" cy="1325563"/>
+          </a:xfrm>
           <a:prstGeom prst="rect">
             <a:avLst/>
           </a:prstGeom>
@@ -3519,6 +3569,10 @@
           </p:nvPr>
         </p:nvSpPr>
         <p:spPr>
+          <a:xfrm>
+            <a:off x="838200" y="1825625"/>
+            <a:ext cx="10515600" cy="4351338"/>
+          </a:xfrm>
           <a:prstGeom prst="rect">
             <a:avLst/>
           </a:prstGeom>
@@ -3558,11 +3612,11 @@
             <a:r>
               <a:rPr b="0" u="sng">
                 <a:solidFill>
-                  <a:srgbClr val="0563C1"/>
+                  <a:srgbClr val="0000FF"/>
                 </a:solidFill>
                 <a:uFill>
                   <a:solidFill>
-                    <a:srgbClr val="0563C1"/>
+                    <a:srgbClr val="0000FF"/>
                   </a:solidFill>
                 </a:uFill>
                 <a:hlinkClick r:id="rId2" invalidUrl="" action="" tgtFrame="" tooltip="" history="1" highlightClick="0" endSnd="0"/>
@@ -3597,11 +3651,11 @@
             <a:r>
               <a:rPr b="0" sz="2400" u="sng">
                 <a:solidFill>
-                  <a:srgbClr val="0563C1"/>
+                  <a:srgbClr val="0000FF"/>
                 </a:solidFill>
                 <a:uFill>
                   <a:solidFill>
-                    <a:srgbClr val="0563C1"/>
+                    <a:srgbClr val="0000FF"/>
                   </a:solidFill>
                 </a:uFill>
                 <a:hlinkClick r:id="rId3" invalidUrl="" action="" tgtFrame="" tooltip="" history="1" highlightClick="0" endSnd="0"/>
@@ -3664,6 +3718,10 @@
           </p:nvPr>
         </p:nvSpPr>
         <p:spPr>
+          <a:xfrm>
+            <a:off x="838200" y="365125"/>
+            <a:ext cx="10515600" cy="1325563"/>
+          </a:xfrm>
           <a:prstGeom prst="rect">
             <a:avLst/>
           </a:prstGeom>
@@ -3688,6 +3746,10 @@
           </p:nvPr>
         </p:nvSpPr>
         <p:spPr>
+          <a:xfrm>
+            <a:off x="838200" y="1825625"/>
+            <a:ext cx="10515600" cy="4351338"/>
+          </a:xfrm>
           <a:prstGeom prst="rect">
             <a:avLst/>
           </a:prstGeom>
@@ -3781,6 +3843,10 @@
           </p:nvPr>
         </p:nvSpPr>
         <p:spPr>
+          <a:xfrm>
+            <a:off x="838200" y="365125"/>
+            <a:ext cx="10515600" cy="1325563"/>
+          </a:xfrm>
           <a:prstGeom prst="rect">
             <a:avLst/>
           </a:prstGeom>
@@ -3818,8 +3884,8 @@
         </p:blipFill>
         <p:spPr>
           <a:xfrm>
-            <a:off x="838200" y="1912143"/>
-            <a:ext cx="2324100" cy="3295651"/>
+            <a:off x="838200" y="1912142"/>
+            <a:ext cx="2324100" cy="3295653"/>
           </a:xfrm>
           <a:prstGeom prst="rect">
             <a:avLst/>
@@ -3849,8 +3915,8 @@
         </p:blipFill>
         <p:spPr>
           <a:xfrm>
-            <a:off x="3321179" y="1912143"/>
-            <a:ext cx="2514208" cy="3295651"/>
+            <a:off x="3321179" y="1912142"/>
+            <a:ext cx="2514209" cy="3295653"/>
           </a:xfrm>
           <a:prstGeom prst="rect">
             <a:avLst/>
@@ -3880,8 +3946,8 @@
         </p:blipFill>
         <p:spPr>
           <a:xfrm>
-            <a:off x="5994267" y="1912143"/>
-            <a:ext cx="2489201" cy="3263901"/>
+            <a:off x="5994267" y="1912142"/>
+            <a:ext cx="2489202" cy="3263903"/>
           </a:xfrm>
           <a:prstGeom prst="rect">
             <a:avLst/>
@@ -3911,8 +3977,8 @@
         </p:blipFill>
         <p:spPr>
           <a:xfrm>
-            <a:off x="9283700" y="1912143"/>
-            <a:ext cx="1625600" cy="584201"/>
+            <a:off x="9283700" y="1912142"/>
+            <a:ext cx="1625600" cy="584202"/>
           </a:xfrm>
           <a:prstGeom prst="rect">
             <a:avLst/>
@@ -3930,8 +3996,8 @@
         </p:nvSpPr>
         <p:spPr>
           <a:xfrm>
-            <a:off x="9329419" y="2832100"/>
-            <a:ext cx="1649200" cy="358140"/>
+            <a:off x="9329418" y="2832100"/>
+            <a:ext cx="1649199" cy="358139"/>
           </a:xfrm>
           <a:prstGeom prst="rect">
             <a:avLst/>
@@ -3946,10 +4012,19 @@
           </a:extLst>
         </p:spPr>
         <p:txBody>
-          <a:bodyPr wrap="none" lIns="45719" rIns="45719">
+          <a:bodyPr wrap="none" lIns="45718" tIns="45718" rIns="45718" bIns="45718">
             <a:spAutoFit/>
           </a:bodyPr>
-          <a:lstStyle/>
+          <a:lstStyle>
+            <a:lvl1pPr>
+              <a:defRPr>
+                <a:latin typeface="Garamond"/>
+                <a:ea typeface="Garamond"/>
+                <a:cs typeface="Garamond"/>
+                <a:sym typeface="Garamond"/>
+              </a:defRPr>
+            </a:lvl1pPr>
+          </a:lstStyle>
           <a:p>
             <a:pPr/>
             <a:r>
@@ -3967,7 +4042,7 @@
         <p:spPr>
           <a:xfrm flipH="1">
             <a:off x="8839199" y="1690688"/>
-            <a:ext cx="1" cy="4062413"/>
+            <a:ext cx="2" cy="4062414"/>
           </a:xfrm>
           <a:prstGeom prst="line">
             <a:avLst/>
@@ -3980,7 +4055,7 @@
           </a:ln>
         </p:spPr>
         <p:txBody>
-          <a:bodyPr lIns="45719" rIns="45719"/>
+          <a:bodyPr lIns="45718" tIns="45718" rIns="45718" bIns="45718"/>
           <a:lstStyle/>
           <a:p>
             <a:pPr/>
@@ -4021,8 +4096,8 @@
         </p:nvSpPr>
         <p:spPr>
           <a:xfrm>
-            <a:off x="4084320" y="6410642"/>
-            <a:ext cx="4023360" cy="256541"/>
+            <a:off x="4084320" y="6410643"/>
+            <a:ext cx="4023360" cy="256539"/>
           </a:xfrm>
           <a:prstGeom prst="rect">
             <a:avLst/>
@@ -4037,7 +4112,7 @@
           </a:extLst>
         </p:spPr>
         <p:txBody>
-          <a:bodyPr lIns="45719" rIns="45719" anchor="ctr">
+          <a:bodyPr lIns="45718" tIns="45718" rIns="45718" bIns="45718" anchor="ctr">
             <a:spAutoFit/>
           </a:bodyPr>
           <a:lstStyle>
@@ -4046,6 +4121,10 @@
                 <a:solidFill>
                   <a:srgbClr val="888888"/>
                 </a:solidFill>
+                <a:latin typeface="Garamond"/>
+                <a:ea typeface="Garamond"/>
+                <a:cs typeface="Garamond"/>
+                <a:sym typeface="Garamond"/>
               </a:defRPr>
             </a:lvl1pPr>
           </a:lstStyle>
@@ -4066,6 +4145,10 @@
           </p:nvPr>
         </p:nvSpPr>
         <p:spPr>
+          <a:xfrm>
+            <a:off x="838200" y="365125"/>
+            <a:ext cx="10515600" cy="1325563"/>
+          </a:xfrm>
           <a:prstGeom prst="rect">
             <a:avLst/>
           </a:prstGeom>
@@ -4100,7 +4183,7 @@
         <p:spPr>
           <a:xfrm>
             <a:off x="4002168" y="1398671"/>
-            <a:ext cx="4187664" cy="4955214"/>
+            <a:ext cx="4187665" cy="4955214"/>
           </a:xfrm>
           <a:prstGeom prst="rect">
             <a:avLst/>
@@ -4144,8 +4227,8 @@
         </p:nvSpPr>
         <p:spPr>
           <a:xfrm>
-            <a:off x="45719" y="6478904"/>
-            <a:ext cx="8061961" cy="256541"/>
+            <a:off x="45719" y="6478905"/>
+            <a:ext cx="8061960" cy="256539"/>
           </a:xfrm>
           <a:prstGeom prst="rect">
             <a:avLst/>
@@ -4160,7 +4243,7 @@
           </a:extLst>
         </p:spPr>
         <p:txBody>
-          <a:bodyPr lIns="45719" rIns="45719" anchor="ctr">
+          <a:bodyPr lIns="45718" tIns="45718" rIns="45718" bIns="45718" anchor="ctr">
             <a:spAutoFit/>
           </a:bodyPr>
           <a:lstStyle>
@@ -4169,6 +4252,10 @@
                 <a:solidFill>
                   <a:srgbClr val="888888"/>
                 </a:solidFill>
+                <a:latin typeface="Garamond"/>
+                <a:ea typeface="Garamond"/>
+                <a:cs typeface="Garamond"/>
+                <a:sym typeface="Garamond"/>
               </a:defRPr>
             </a:lvl1pPr>
           </a:lstStyle>
@@ -4189,6 +4276,10 @@
           </p:nvPr>
         </p:nvSpPr>
         <p:spPr>
+          <a:xfrm>
+            <a:off x="838200" y="365125"/>
+            <a:ext cx="10515600" cy="1325563"/>
+          </a:xfrm>
           <a:prstGeom prst="rect">
             <a:avLst/>
           </a:prstGeom>
@@ -4268,6 +4359,10 @@
           </p:nvPr>
         </p:nvSpPr>
         <p:spPr>
+          <a:xfrm>
+            <a:off x="838200" y="365125"/>
+            <a:ext cx="10515600" cy="1325563"/>
+          </a:xfrm>
           <a:prstGeom prst="rect">
             <a:avLst/>
           </a:prstGeom>
@@ -4292,6 +4387,10 @@
           </p:nvPr>
         </p:nvSpPr>
         <p:spPr>
+          <a:xfrm>
+            <a:off x="838200" y="1825625"/>
+            <a:ext cx="10515600" cy="4351338"/>
+          </a:xfrm>
           <a:prstGeom prst="rect">
             <a:avLst/>
           </a:prstGeom>
@@ -4299,6 +4398,12 @@
         <p:txBody>
           <a:bodyPr/>
           <a:lstStyle/>
+          <a:p>
+            <a:pPr/>
+            <a:r>
+              <a:t>Generative AI (week 11)</a:t>
+            </a:r>
+          </a:p>
           <a:p>
             <a:pPr/>
             <a:r>
@@ -4359,8 +4464,8 @@
         </p:nvSpPr>
         <p:spPr>
           <a:xfrm>
-            <a:off x="157231" y="6328092"/>
-            <a:ext cx="7950449" cy="421641"/>
+            <a:off x="157231" y="6410643"/>
+            <a:ext cx="7950449" cy="256539"/>
           </a:xfrm>
           <a:prstGeom prst="rect">
             <a:avLst/>
@@ -4375,7 +4480,7 @@
           </a:extLst>
         </p:spPr>
         <p:txBody>
-          <a:bodyPr lIns="45719" rIns="45719" anchor="ctr">
+          <a:bodyPr lIns="45718" tIns="45718" rIns="45718" bIns="45718" anchor="ctr">
             <a:spAutoFit/>
           </a:bodyPr>
           <a:lstStyle>
@@ -4384,6 +4489,10 @@
                 <a:solidFill>
                   <a:srgbClr val="888888"/>
                 </a:solidFill>
+                <a:latin typeface="Garamond"/>
+                <a:ea typeface="Garamond"/>
+                <a:cs typeface="Garamond"/>
+                <a:sym typeface="Garamond"/>
               </a:defRPr>
             </a:lvl1pPr>
           </a:lstStyle>
@@ -4404,6 +4513,10 @@
           </p:nvPr>
         </p:nvSpPr>
         <p:spPr>
+          <a:xfrm>
+            <a:off x="838200" y="365125"/>
+            <a:ext cx="10515600" cy="1325563"/>
+          </a:xfrm>
           <a:prstGeom prst="rect">
             <a:avLst/>
           </a:prstGeom>
@@ -4428,6 +4541,10 @@
           </p:nvPr>
         </p:nvSpPr>
         <p:spPr>
+          <a:xfrm>
+            <a:off x="838200" y="1825625"/>
+            <a:ext cx="10515600" cy="4351338"/>
+          </a:xfrm>
           <a:prstGeom prst="rect">
             <a:avLst/>
           </a:prstGeom>
@@ -4514,6 +4631,10 @@
           </p:nvPr>
         </p:nvSpPr>
         <p:spPr>
+          <a:xfrm>
+            <a:off x="838200" y="365125"/>
+            <a:ext cx="10515600" cy="1325563"/>
+          </a:xfrm>
           <a:prstGeom prst="rect">
             <a:avLst/>
           </a:prstGeom>
@@ -4627,14 +4748,14 @@
     </a:clrScheme>
     <a:fontScheme name="Office Theme">
       <a:majorFont>
+        <a:latin typeface="Calibri"/>
+        <a:ea typeface="Calibri"/>
+        <a:cs typeface="Calibri"/>
+      </a:majorFont>
+      <a:minorFont>
         <a:latin typeface="Helvetica"/>
         <a:ea typeface="Helvetica"/>
         <a:cs typeface="Helvetica"/>
-      </a:majorFont>
-      <a:minorFont>
-        <a:latin typeface="Calibri"/>
-        <a:ea typeface="Calibri"/>
-        <a:cs typeface="Calibri"/>
       </a:minorFont>
     </a:fontScheme>
     <a:fmtScheme name="Office Theme">
@@ -4777,17 +4898,17 @@
         <a:solidFill>
           <a:srgbClr val="FFFFFF"/>
         </a:solidFill>
-        <a:ln w="12700" cap="flat">
+        <a:ln w="25400" cap="flat">
           <a:solidFill>
             <a:schemeClr val="accent1"/>
           </a:solidFill>
           <a:prstDash val="solid"/>
-          <a:miter lim="800000"/>
+          <a:round/>
         </a:ln>
         <a:effectLst/>
         <a:sp3d/>
       </a:spPr>
-      <a:bodyPr rot="0" spcFirstLastPara="1" vertOverflow="overflow" horzOverflow="overflow" vert="horz" wrap="square" lIns="45719" tIns="45719" rIns="45719" bIns="45719" numCol="1" spcCol="38100" rtlCol="0" anchor="ctr" upright="0">
+      <a:bodyPr rot="0" spcFirstLastPara="1" vertOverflow="overflow" horzOverflow="overflow" vert="horz" wrap="square" lIns="45718" tIns="45718" rIns="45718" bIns="45718" numCol="1" spcCol="38100" rtlCol="0" anchor="ctr" upright="0">
         <a:spAutoFit/>
       </a:bodyPr>
       <a:lstStyle>
@@ -4815,10 +4936,10 @@
             </a:solidFill>
             <a:effectLst/>
             <a:uFillTx/>
-            <a:latin typeface="Garamond"/>
-            <a:ea typeface="Garamond"/>
-            <a:cs typeface="Garamond"/>
-            <a:sym typeface="Garamond"/>
+            <a:latin typeface="+mj-lt"/>
+            <a:ea typeface="+mj-ea"/>
+            <a:cs typeface="+mj-cs"/>
+            <a:sym typeface="Calibri"/>
           </a:defRPr>
         </a:defPPr>
         <a:lvl1pPr marL="0" marR="0" indent="0" algn="l" defTabSz="914400" rtl="0" fontAlgn="auto" latinLnBrk="1" hangingPunct="0">
@@ -5066,12 +5187,12 @@
     <a:lnDef>
       <a:spPr>
         <a:noFill/>
-        <a:ln w="12700" cap="flat">
+        <a:ln w="25400" cap="flat">
           <a:solidFill>
             <a:schemeClr val="accent1"/>
           </a:solidFill>
           <a:prstDash val="solid"/>
-          <a:miter lim="800000"/>
+          <a:round/>
         </a:ln>
         <a:effectLst/>
         <a:sp3d/>
@@ -5358,7 +5479,7 @@
         <a:effectLst/>
         <a:sp3d/>
       </a:spPr>
-      <a:bodyPr rot="0" spcFirstLastPara="1" vertOverflow="overflow" horzOverflow="overflow" vert="horz" wrap="square" lIns="45719" tIns="45719" rIns="45719" bIns="45719" numCol="1" spcCol="38100" rtlCol="0" anchor="t" upright="0">
+      <a:bodyPr rot="0" spcFirstLastPara="1" vertOverflow="overflow" horzOverflow="overflow" vert="horz" wrap="square" lIns="45718" tIns="45718" rIns="45718" bIns="45718" numCol="1" spcCol="38100" rtlCol="0" anchor="t" upright="0">
         <a:spAutoFit/>
       </a:bodyPr>
       <a:lstStyle>
@@ -5386,10 +5507,10 @@
             </a:solidFill>
             <a:effectLst/>
             <a:uFillTx/>
-            <a:latin typeface="Garamond"/>
-            <a:ea typeface="Garamond"/>
-            <a:cs typeface="Garamond"/>
-            <a:sym typeface="Garamond"/>
+            <a:latin typeface="+mj-lt"/>
+            <a:ea typeface="+mj-ea"/>
+            <a:cs typeface="+mj-cs"/>
+            <a:sym typeface="Calibri"/>
           </a:defRPr>
         </a:defPPr>
         <a:lvl1pPr marL="0" marR="0" indent="0" algn="l" defTabSz="914400" rtl="0" fontAlgn="auto" latinLnBrk="1" hangingPunct="0">
@@ -5681,14 +5802,14 @@
     </a:clrScheme>
     <a:fontScheme name="Office Theme">
       <a:majorFont>
+        <a:latin typeface="Calibri"/>
+        <a:ea typeface="Calibri"/>
+        <a:cs typeface="Calibri"/>
+      </a:majorFont>
+      <a:minorFont>
         <a:latin typeface="Helvetica"/>
         <a:ea typeface="Helvetica"/>
         <a:cs typeface="Helvetica"/>
-      </a:majorFont>
-      <a:minorFont>
-        <a:latin typeface="Calibri"/>
-        <a:ea typeface="Calibri"/>
-        <a:cs typeface="Calibri"/>
       </a:minorFont>
     </a:fontScheme>
     <a:fmtScheme name="Office Theme">
@@ -5831,17 +5952,17 @@
         <a:solidFill>
           <a:srgbClr val="FFFFFF"/>
         </a:solidFill>
-        <a:ln w="12700" cap="flat">
+        <a:ln w="25400" cap="flat">
           <a:solidFill>
             <a:schemeClr val="accent1"/>
           </a:solidFill>
           <a:prstDash val="solid"/>
-          <a:miter lim="800000"/>
+          <a:round/>
         </a:ln>
         <a:effectLst/>
         <a:sp3d/>
       </a:spPr>
-      <a:bodyPr rot="0" spcFirstLastPara="1" vertOverflow="overflow" horzOverflow="overflow" vert="horz" wrap="square" lIns="45719" tIns="45719" rIns="45719" bIns="45719" numCol="1" spcCol="38100" rtlCol="0" anchor="ctr" upright="0">
+      <a:bodyPr rot="0" spcFirstLastPara="1" vertOverflow="overflow" horzOverflow="overflow" vert="horz" wrap="square" lIns="45718" tIns="45718" rIns="45718" bIns="45718" numCol="1" spcCol="38100" rtlCol="0" anchor="ctr" upright="0">
         <a:spAutoFit/>
       </a:bodyPr>
       <a:lstStyle>
@@ -5869,10 +5990,10 @@
             </a:solidFill>
             <a:effectLst/>
             <a:uFillTx/>
-            <a:latin typeface="Garamond"/>
-            <a:ea typeface="Garamond"/>
-            <a:cs typeface="Garamond"/>
-            <a:sym typeface="Garamond"/>
+            <a:latin typeface="+mj-lt"/>
+            <a:ea typeface="+mj-ea"/>
+            <a:cs typeface="+mj-cs"/>
+            <a:sym typeface="Calibri"/>
           </a:defRPr>
         </a:defPPr>
         <a:lvl1pPr marL="0" marR="0" indent="0" algn="l" defTabSz="914400" rtl="0" fontAlgn="auto" latinLnBrk="1" hangingPunct="0">
@@ -6120,12 +6241,12 @@
     <a:lnDef>
       <a:spPr>
         <a:noFill/>
-        <a:ln w="12700" cap="flat">
+        <a:ln w="25400" cap="flat">
           <a:solidFill>
             <a:schemeClr val="accent1"/>
           </a:solidFill>
           <a:prstDash val="solid"/>
-          <a:miter lim="800000"/>
+          <a:round/>
         </a:ln>
         <a:effectLst/>
         <a:sp3d/>
@@ -6412,7 +6533,7 @@
         <a:effectLst/>
         <a:sp3d/>
       </a:spPr>
-      <a:bodyPr rot="0" spcFirstLastPara="1" vertOverflow="overflow" horzOverflow="overflow" vert="horz" wrap="square" lIns="45719" tIns="45719" rIns="45719" bIns="45719" numCol="1" spcCol="38100" rtlCol="0" anchor="t" upright="0">
+      <a:bodyPr rot="0" spcFirstLastPara="1" vertOverflow="overflow" horzOverflow="overflow" vert="horz" wrap="square" lIns="45718" tIns="45718" rIns="45718" bIns="45718" numCol="1" spcCol="38100" rtlCol="0" anchor="t" upright="0">
         <a:spAutoFit/>
       </a:bodyPr>
       <a:lstStyle>
@@ -6440,10 +6561,10 @@
             </a:solidFill>
             <a:effectLst/>
             <a:uFillTx/>
-            <a:latin typeface="Garamond"/>
-            <a:ea typeface="Garamond"/>
-            <a:cs typeface="Garamond"/>
-            <a:sym typeface="Garamond"/>
+            <a:latin typeface="+mj-lt"/>
+            <a:ea typeface="+mj-ea"/>
+            <a:cs typeface="+mj-cs"/>
+            <a:sym typeface="Calibri"/>
           </a:defRPr>
         </a:defPPr>
         <a:lvl1pPr marL="0" marR="0" indent="0" algn="l" defTabSz="914400" rtl="0" fontAlgn="auto" latinLnBrk="1" hangingPunct="0">

</xml_diff>

<commit_message>
week 1 speaker note
</commit_message>
<xml_diff>
--- a/course slides/week_01.pptx
+++ b/course slides/week_01.pptx
@@ -80,7 +80,7 @@
         <a:latin typeface="+mj-lt"/>
         <a:ea typeface="+mj-ea"/>
         <a:cs typeface="+mj-cs"/>
-        <a:sym typeface="Calibri"/>
+        <a:sym typeface="Helvetica"/>
       </a:defRPr>
     </a:lvl1pPr>
     <a:lvl2pPr marL="0" marR="0" indent="0" algn="l" defTabSz="914400" rtl="0" fontAlgn="auto" latinLnBrk="0" hangingPunct="0">
@@ -110,7 +110,7 @@
         <a:latin typeface="+mj-lt"/>
         <a:ea typeface="+mj-ea"/>
         <a:cs typeface="+mj-cs"/>
-        <a:sym typeface="Calibri"/>
+        <a:sym typeface="Helvetica"/>
       </a:defRPr>
     </a:lvl2pPr>
     <a:lvl3pPr marL="0" marR="0" indent="0" algn="l" defTabSz="914400" rtl="0" fontAlgn="auto" latinLnBrk="0" hangingPunct="0">
@@ -140,7 +140,7 @@
         <a:latin typeface="+mj-lt"/>
         <a:ea typeface="+mj-ea"/>
         <a:cs typeface="+mj-cs"/>
-        <a:sym typeface="Calibri"/>
+        <a:sym typeface="Helvetica"/>
       </a:defRPr>
     </a:lvl3pPr>
     <a:lvl4pPr marL="0" marR="0" indent="0" algn="l" defTabSz="914400" rtl="0" fontAlgn="auto" latinLnBrk="0" hangingPunct="0">
@@ -170,7 +170,7 @@
         <a:latin typeface="+mj-lt"/>
         <a:ea typeface="+mj-ea"/>
         <a:cs typeface="+mj-cs"/>
-        <a:sym typeface="Calibri"/>
+        <a:sym typeface="Helvetica"/>
       </a:defRPr>
     </a:lvl4pPr>
     <a:lvl5pPr marL="0" marR="0" indent="0" algn="l" defTabSz="914400" rtl="0" fontAlgn="auto" latinLnBrk="0" hangingPunct="0">
@@ -200,7 +200,7 @@
         <a:latin typeface="+mj-lt"/>
         <a:ea typeface="+mj-ea"/>
         <a:cs typeface="+mj-cs"/>
-        <a:sym typeface="Calibri"/>
+        <a:sym typeface="Helvetica"/>
       </a:defRPr>
     </a:lvl5pPr>
     <a:lvl6pPr marL="0" marR="0" indent="0" algn="l" defTabSz="914400" rtl="0" fontAlgn="auto" latinLnBrk="0" hangingPunct="0">
@@ -230,7 +230,7 @@
         <a:latin typeface="+mj-lt"/>
         <a:ea typeface="+mj-ea"/>
         <a:cs typeface="+mj-cs"/>
-        <a:sym typeface="Calibri"/>
+        <a:sym typeface="Helvetica"/>
       </a:defRPr>
     </a:lvl6pPr>
     <a:lvl7pPr marL="0" marR="0" indent="0" algn="l" defTabSz="914400" rtl="0" fontAlgn="auto" latinLnBrk="0" hangingPunct="0">
@@ -260,7 +260,7 @@
         <a:latin typeface="+mj-lt"/>
         <a:ea typeface="+mj-ea"/>
         <a:cs typeface="+mj-cs"/>
-        <a:sym typeface="Calibri"/>
+        <a:sym typeface="Helvetica"/>
       </a:defRPr>
     </a:lvl7pPr>
     <a:lvl8pPr marL="0" marR="0" indent="0" algn="l" defTabSz="914400" rtl="0" fontAlgn="auto" latinLnBrk="0" hangingPunct="0">
@@ -290,7 +290,7 @@
         <a:latin typeface="+mj-lt"/>
         <a:ea typeface="+mj-ea"/>
         <a:cs typeface="+mj-cs"/>
-        <a:sym typeface="Calibri"/>
+        <a:sym typeface="Helvetica"/>
       </a:defRPr>
     </a:lvl8pPr>
     <a:lvl9pPr marL="0" marR="0" indent="0" algn="l" defTabSz="914400" rtl="0" fontAlgn="auto" latinLnBrk="0" hangingPunct="0">
@@ -320,7 +320,7 @@
         <a:latin typeface="+mj-lt"/>
         <a:ea typeface="+mj-ea"/>
         <a:cs typeface="+mj-cs"/>
-        <a:sym typeface="Calibri"/>
+        <a:sym typeface="Helvetica"/>
       </a:defRPr>
     </a:lvl9pPr>
   </p:defaultTextStyle>
@@ -404,73 +404,73 @@
   <p:notesStyle>
     <a:lvl1pPr latinLnBrk="0">
       <a:defRPr sz="1200">
-        <a:latin typeface="+mj-lt"/>
-        <a:ea typeface="+mj-ea"/>
-        <a:cs typeface="+mj-cs"/>
+        <a:latin typeface="+mn-lt"/>
+        <a:ea typeface="+mn-ea"/>
+        <a:cs typeface="+mn-cs"/>
         <a:sym typeface="Calibri"/>
       </a:defRPr>
     </a:lvl1pPr>
     <a:lvl2pPr indent="228600" latinLnBrk="0">
       <a:defRPr sz="1200">
-        <a:latin typeface="+mj-lt"/>
-        <a:ea typeface="+mj-ea"/>
-        <a:cs typeface="+mj-cs"/>
+        <a:latin typeface="+mn-lt"/>
+        <a:ea typeface="+mn-ea"/>
+        <a:cs typeface="+mn-cs"/>
         <a:sym typeface="Calibri"/>
       </a:defRPr>
     </a:lvl2pPr>
     <a:lvl3pPr indent="457200" latinLnBrk="0">
       <a:defRPr sz="1200">
-        <a:latin typeface="+mj-lt"/>
-        <a:ea typeface="+mj-ea"/>
-        <a:cs typeface="+mj-cs"/>
+        <a:latin typeface="+mn-lt"/>
+        <a:ea typeface="+mn-ea"/>
+        <a:cs typeface="+mn-cs"/>
         <a:sym typeface="Calibri"/>
       </a:defRPr>
     </a:lvl3pPr>
     <a:lvl4pPr indent="685800" latinLnBrk="0">
       <a:defRPr sz="1200">
-        <a:latin typeface="+mj-lt"/>
-        <a:ea typeface="+mj-ea"/>
-        <a:cs typeface="+mj-cs"/>
+        <a:latin typeface="+mn-lt"/>
+        <a:ea typeface="+mn-ea"/>
+        <a:cs typeface="+mn-cs"/>
         <a:sym typeface="Calibri"/>
       </a:defRPr>
     </a:lvl4pPr>
     <a:lvl5pPr indent="914400" latinLnBrk="0">
       <a:defRPr sz="1200">
-        <a:latin typeface="+mj-lt"/>
-        <a:ea typeface="+mj-ea"/>
-        <a:cs typeface="+mj-cs"/>
+        <a:latin typeface="+mn-lt"/>
+        <a:ea typeface="+mn-ea"/>
+        <a:cs typeface="+mn-cs"/>
         <a:sym typeface="Calibri"/>
       </a:defRPr>
     </a:lvl5pPr>
     <a:lvl6pPr indent="1143000" latinLnBrk="0">
       <a:defRPr sz="1200">
-        <a:latin typeface="+mj-lt"/>
-        <a:ea typeface="+mj-ea"/>
-        <a:cs typeface="+mj-cs"/>
+        <a:latin typeface="+mn-lt"/>
+        <a:ea typeface="+mn-ea"/>
+        <a:cs typeface="+mn-cs"/>
         <a:sym typeface="Calibri"/>
       </a:defRPr>
     </a:lvl6pPr>
     <a:lvl7pPr indent="1371600" latinLnBrk="0">
       <a:defRPr sz="1200">
-        <a:latin typeface="+mj-lt"/>
-        <a:ea typeface="+mj-ea"/>
-        <a:cs typeface="+mj-cs"/>
+        <a:latin typeface="+mn-lt"/>
+        <a:ea typeface="+mn-ea"/>
+        <a:cs typeface="+mn-cs"/>
         <a:sym typeface="Calibri"/>
       </a:defRPr>
     </a:lvl7pPr>
     <a:lvl8pPr indent="1600200" latinLnBrk="0">
       <a:defRPr sz="1200">
-        <a:latin typeface="+mj-lt"/>
-        <a:ea typeface="+mj-ea"/>
-        <a:cs typeface="+mj-cs"/>
+        <a:latin typeface="+mn-lt"/>
+        <a:ea typeface="+mn-ea"/>
+        <a:cs typeface="+mn-cs"/>
         <a:sym typeface="Calibri"/>
       </a:defRPr>
     </a:lvl8pPr>
     <a:lvl9pPr indent="1828800" latinLnBrk="0">
       <a:defRPr sz="1200">
-        <a:latin typeface="+mj-lt"/>
-        <a:ea typeface="+mj-ea"/>
-        <a:cs typeface="+mj-cs"/>
+        <a:latin typeface="+mn-lt"/>
+        <a:ea typeface="+mn-ea"/>
+        <a:cs typeface="+mn-cs"/>
         <a:sym typeface="Calibri"/>
       </a:defRPr>
     </a:lvl9pPr>
@@ -552,6 +552,58 @@
             <a:r>
               <a:t>What is algorithm? </a:t>
             </a:r>
+          </a:p>
+          <a:p>
+            <a:pPr/>
+          </a:p>
+          <a:p>
+            <a:pPr/>
+            <a:r>
+              <a:t>Coding is hard - needs focus, attention, logical problem solving, requires a state of mind called being ‘in the flow’, a quasi-symbiotic relationship between human and machine that improves performance and motivation.</a:t>
+            </a:r>
+          </a:p>
+          <a:p>
+            <a:pPr/>
+          </a:p>
+          <a:p>
+            <a:pPr/>
+            <a:r>
+              <a:t>Coding isn’t the only job like that, but media/ent, policymakers and technologists pretend otherwise</a:t>
+            </a:r>
+          </a:p>
+          <a:p>
+            <a:pPr/>
+          </a:p>
+          <a:p>
+            <a:pPr/>
+          </a:p>
+          <a:p>
+            <a:pPr/>
+            <a:r>
+              <a:rPr b="1"/>
+              <a:t>Ethically complex</a:t>
+            </a:r>
+            <a:r>
+              <a:t>: More and more ‘decisions’ are being entrusted to software, including life-or-death ones: think self-driving cars; think semi-autonomous weapons. we can’t respond to them by answering exclusively technical questions. </a:t>
+            </a:r>
+          </a:p>
+          <a:p>
+            <a:pPr/>
+          </a:p>
+          <a:p>
+            <a:pPr/>
+          </a:p>
+          <a:p>
+            <a:pPr/>
+            <a:r>
+              <a:t>the machine does what you say, not what you mean. Programming is not a detail that can be left to ‘technicians’ under the false pretence that their choices will be ‘scientifically neutral’</a:t>
+            </a:r>
+          </a:p>
+          <a:p>
+            <a:pPr/>
+          </a:p>
+          <a:p>
+            <a:pPr/>
           </a:p>
         </p:txBody>
       </p:sp>
@@ -623,7 +675,7 @@
         <p:spPr>
           <a:xfrm>
             <a:off x="1524000" y="3602037"/>
-            <a:ext cx="9144000" cy="1655764"/>
+            <a:ext cx="9144000" cy="1655765"/>
           </a:xfrm>
           <a:prstGeom prst="rect">
             <a:avLst/>
@@ -906,7 +958,7 @@
         <p:spPr>
           <a:xfrm>
             <a:off x="831850" y="4589462"/>
-            <a:ext cx="10515600" cy="1500189"/>
+            <a:ext cx="10515600" cy="1500190"/>
           </a:xfrm>
           <a:prstGeom prst="rect">
             <a:avLst/>
@@ -1209,7 +1261,7 @@
         <p:spPr>
           <a:xfrm>
             <a:off x="839787" y="1681163"/>
-            <a:ext cx="5157790" cy="823914"/>
+            <a:ext cx="5157790" cy="823915"/>
           </a:xfrm>
           <a:prstGeom prst="rect">
             <a:avLst/>
@@ -1517,7 +1569,7 @@
         <p:spPr>
           <a:xfrm>
             <a:off x="5183187" y="987425"/>
-            <a:ext cx="6172202" cy="4873625"/>
+            <a:ext cx="6172203" cy="4873625"/>
           </a:xfrm>
           <a:prstGeom prst="rect">
             <a:avLst/>
@@ -1690,7 +1742,7 @@
         <p:spPr>
           <a:xfrm>
             <a:off x="5183187" y="987425"/>
-            <a:ext cx="6172202" cy="4873625"/>
+            <a:ext cx="6172203" cy="4873625"/>
           </a:xfrm>
           <a:prstGeom prst="rect">
             <a:avLst/>
@@ -1954,8 +2006,8 @@
         </p:nvSpPr>
         <p:spPr>
           <a:xfrm>
-            <a:off x="11106786" y="6410643"/>
-            <a:ext cx="247014" cy="256539"/>
+            <a:off x="11106788" y="6410644"/>
+            <a:ext cx="247012" cy="256537"/>
           </a:xfrm>
           <a:prstGeom prst="rect">
             <a:avLst/>
@@ -3021,7 +3073,7 @@
         <p:spPr>
           <a:xfrm>
             <a:off x="7066156" y="0"/>
-            <a:ext cx="5125846" cy="7226018"/>
+            <a:ext cx="5125847" cy="7226018"/>
           </a:xfrm>
           <a:prstGeom prst="rect">
             <a:avLst/>
@@ -3065,8 +3117,8 @@
         </p:nvSpPr>
         <p:spPr>
           <a:xfrm>
-            <a:off x="350520" y="6383657"/>
-            <a:ext cx="7757160" cy="256539"/>
+            <a:off x="350520" y="6383656"/>
+            <a:ext cx="7757160" cy="256537"/>
           </a:xfrm>
           <a:prstGeom prst="rect">
             <a:avLst/>
@@ -3885,7 +3937,7 @@
         <p:spPr>
           <a:xfrm>
             <a:off x="838200" y="1912142"/>
-            <a:ext cx="2324100" cy="3295653"/>
+            <a:ext cx="2324100" cy="3295654"/>
           </a:xfrm>
           <a:prstGeom prst="rect">
             <a:avLst/>
@@ -3916,7 +3968,7 @@
         <p:spPr>
           <a:xfrm>
             <a:off x="3321179" y="1912142"/>
-            <a:ext cx="2514209" cy="3295653"/>
+            <a:ext cx="2514210" cy="3295654"/>
           </a:xfrm>
           <a:prstGeom prst="rect">
             <a:avLst/>
@@ -3947,7 +3999,7 @@
         <p:spPr>
           <a:xfrm>
             <a:off x="5994267" y="1912142"/>
-            <a:ext cx="2489202" cy="3263903"/>
+            <a:ext cx="2489203" cy="3263904"/>
           </a:xfrm>
           <a:prstGeom prst="rect">
             <a:avLst/>
@@ -3996,8 +4048,8 @@
         </p:nvSpPr>
         <p:spPr>
           <a:xfrm>
-            <a:off x="9329418" y="2832100"/>
-            <a:ext cx="1649199" cy="358139"/>
+            <a:off x="9329418" y="2832099"/>
+            <a:ext cx="1649196" cy="358137"/>
           </a:xfrm>
           <a:prstGeom prst="rect">
             <a:avLst/>
@@ -4042,7 +4094,7 @@
         <p:spPr>
           <a:xfrm flipH="1">
             <a:off x="8839199" y="1690688"/>
-            <a:ext cx="2" cy="4062414"/>
+            <a:ext cx="3" cy="4062415"/>
           </a:xfrm>
           <a:prstGeom prst="line">
             <a:avLst/>
@@ -4096,8 +4148,8 @@
         </p:nvSpPr>
         <p:spPr>
           <a:xfrm>
-            <a:off x="4084320" y="6410643"/>
-            <a:ext cx="4023360" cy="256539"/>
+            <a:off x="4084320" y="6410642"/>
+            <a:ext cx="4023360" cy="256537"/>
           </a:xfrm>
           <a:prstGeom prst="rect">
             <a:avLst/>
@@ -4183,7 +4235,7 @@
         <p:spPr>
           <a:xfrm>
             <a:off x="4002168" y="1398671"/>
-            <a:ext cx="4187665" cy="4955214"/>
+            <a:ext cx="4187666" cy="4955214"/>
           </a:xfrm>
           <a:prstGeom prst="rect">
             <a:avLst/>
@@ -4227,8 +4279,8 @@
         </p:nvSpPr>
         <p:spPr>
           <a:xfrm>
-            <a:off x="45719" y="6478905"/>
-            <a:ext cx="8061960" cy="256539"/>
+            <a:off x="45719" y="6478904"/>
+            <a:ext cx="8061960" cy="256537"/>
           </a:xfrm>
           <a:prstGeom prst="rect">
             <a:avLst/>
@@ -4464,8 +4516,8 @@
         </p:nvSpPr>
         <p:spPr>
           <a:xfrm>
-            <a:off x="157231" y="6410643"/>
-            <a:ext cx="7950449" cy="256539"/>
+            <a:off x="157231" y="6410642"/>
+            <a:ext cx="7950449" cy="256537"/>
           </a:xfrm>
           <a:prstGeom prst="rect">
             <a:avLst/>
@@ -4748,14 +4800,14 @@
     </a:clrScheme>
     <a:fontScheme name="Office Theme">
       <a:majorFont>
+        <a:latin typeface="Helvetica"/>
+        <a:ea typeface="Helvetica"/>
+        <a:cs typeface="Helvetica"/>
+      </a:majorFont>
+      <a:minorFont>
         <a:latin typeface="Calibri"/>
         <a:ea typeface="Calibri"/>
         <a:cs typeface="Calibri"/>
-      </a:majorFont>
-      <a:minorFont>
-        <a:latin typeface="Helvetica"/>
-        <a:ea typeface="Helvetica"/>
-        <a:cs typeface="Helvetica"/>
       </a:minorFont>
     </a:fontScheme>
     <a:fmtScheme name="Office Theme">
@@ -4939,7 +4991,7 @@
             <a:latin typeface="+mj-lt"/>
             <a:ea typeface="+mj-ea"/>
             <a:cs typeface="+mj-cs"/>
-            <a:sym typeface="Calibri"/>
+            <a:sym typeface="Helvetica"/>
           </a:defRPr>
         </a:defPPr>
         <a:lvl1pPr marL="0" marR="0" indent="0" algn="l" defTabSz="914400" rtl="0" fontAlgn="auto" latinLnBrk="1" hangingPunct="0">
@@ -5510,7 +5562,7 @@
             <a:latin typeface="+mj-lt"/>
             <a:ea typeface="+mj-ea"/>
             <a:cs typeface="+mj-cs"/>
-            <a:sym typeface="Calibri"/>
+            <a:sym typeface="Helvetica"/>
           </a:defRPr>
         </a:defPPr>
         <a:lvl1pPr marL="0" marR="0" indent="0" algn="l" defTabSz="914400" rtl="0" fontAlgn="auto" latinLnBrk="1" hangingPunct="0">
@@ -5802,14 +5854,14 @@
     </a:clrScheme>
     <a:fontScheme name="Office Theme">
       <a:majorFont>
+        <a:latin typeface="Helvetica"/>
+        <a:ea typeface="Helvetica"/>
+        <a:cs typeface="Helvetica"/>
+      </a:majorFont>
+      <a:minorFont>
         <a:latin typeface="Calibri"/>
         <a:ea typeface="Calibri"/>
         <a:cs typeface="Calibri"/>
-      </a:majorFont>
-      <a:minorFont>
-        <a:latin typeface="Helvetica"/>
-        <a:ea typeface="Helvetica"/>
-        <a:cs typeface="Helvetica"/>
       </a:minorFont>
     </a:fontScheme>
     <a:fmtScheme name="Office Theme">
@@ -5993,7 +6045,7 @@
             <a:latin typeface="+mj-lt"/>
             <a:ea typeface="+mj-ea"/>
             <a:cs typeface="+mj-cs"/>
-            <a:sym typeface="Calibri"/>
+            <a:sym typeface="Helvetica"/>
           </a:defRPr>
         </a:defPPr>
         <a:lvl1pPr marL="0" marR="0" indent="0" algn="l" defTabSz="914400" rtl="0" fontAlgn="auto" latinLnBrk="1" hangingPunct="0">
@@ -6564,7 +6616,7 @@
             <a:latin typeface="+mj-lt"/>
             <a:ea typeface="+mj-ea"/>
             <a:cs typeface="+mj-cs"/>
-            <a:sym typeface="Calibri"/>
+            <a:sym typeface="Helvetica"/>
           </a:defRPr>
         </a:defPPr>
         <a:lvl1pPr marL="0" marR="0" indent="0" algn="l" defTabSz="914400" rtl="0" fontAlgn="auto" latinLnBrk="1" hangingPunct="0">

</xml_diff>